<commit_message>
Added lecture 04 notes
</commit_message>
<xml_diff>
--- a/Notes/Lecture01/Introduction.pptx
+++ b/Notes/Lecture01/Introduction.pptx
@@ -5,7 +5,7 @@
     <p:sldMasterId id="2147483648" r:id="rId1"/>
   </p:sldMasterIdLst>
   <p:notesMasterIdLst>
-    <p:notesMasterId r:id="rId31"/>
+    <p:notesMasterId r:id="rId33"/>
   </p:notesMasterIdLst>
   <p:sldIdLst>
     <p:sldId id="256" r:id="rId2"/>
@@ -31,12 +31,14 @@
     <p:sldId id="277" r:id="rId22"/>
     <p:sldId id="279" r:id="rId23"/>
     <p:sldId id="1479" r:id="rId24"/>
-    <p:sldId id="1481" r:id="rId25"/>
-    <p:sldId id="1480" r:id="rId26"/>
-    <p:sldId id="1482" r:id="rId27"/>
-    <p:sldId id="1478" r:id="rId28"/>
-    <p:sldId id="1483" r:id="rId29"/>
-    <p:sldId id="1484" r:id="rId30"/>
+    <p:sldId id="1486" r:id="rId25"/>
+    <p:sldId id="1487" r:id="rId26"/>
+    <p:sldId id="1481" r:id="rId27"/>
+    <p:sldId id="1480" r:id="rId28"/>
+    <p:sldId id="1482" r:id="rId29"/>
+    <p:sldId id="1478" r:id="rId30"/>
+    <p:sldId id="1483" r:id="rId31"/>
+    <p:sldId id="1484" r:id="rId32"/>
   </p:sldIdLst>
   <p:sldSz cx="12192000" cy="6858000"/>
   <p:notesSz cx="6858000" cy="9144000"/>
@@ -143,16 +145,63 @@
 </p:presentation>
 </file>
 
-<file path=ppt/revisionInfo.xml><?xml version="1.0" encoding="utf-8"?>
-<p1510:revInfo xmlns:a="http://schemas.openxmlformats.org/drawingml/2006/main" xmlns:r="http://schemas.openxmlformats.org/officeDocument/2006/relationships" xmlns:p1510="http://schemas.microsoft.com/office/powerpoint/2015/10/main">
-  <p1510:revLst>
-    <p1510:client id="{F6627E7C-254C-4CFC-85E7-687213A6AF2E}" v="44" dt="2025-01-15T17:24:55.176"/>
-  </p1510:revLst>
-</p1510:revInfo>
-</file>
-
 <file path=ppt/changesInfos/changesInfo1.xml><?xml version="1.0" encoding="utf-8"?>
 <pc:chgInfo xmlns:a="http://schemas.openxmlformats.org/drawingml/2006/main" xmlns:r="http://schemas.openxmlformats.org/officeDocument/2006/relationships" xmlns:ac="http://schemas.microsoft.com/office/drawing/2013/main/command" xmlns:pc="http://schemas.microsoft.com/office/powerpoint/2013/main/command">
+  <pc:docChgLst>
+    <pc:chgData name="Liyana Ralalage, Adiesha" userId="15fd5c93-10d6-4014-8103-1a4931e3c018" providerId="ADAL" clId="{42A7EE47-EC45-4CA9-8431-8D220F8AFA23}"/>
+    <pc:docChg chg="undo custSel addSld modSld">
+      <pc:chgData name="Liyana Ralalage, Adiesha" userId="15fd5c93-10d6-4014-8103-1a4931e3c018" providerId="ADAL" clId="{42A7EE47-EC45-4CA9-8431-8D220F8AFA23}" dt="2025-01-18T02:47:30.446" v="30" actId="5793"/>
+      <pc:docMkLst>
+        <pc:docMk/>
+      </pc:docMkLst>
+      <pc:sldChg chg="modSp new mod">
+        <pc:chgData name="Liyana Ralalage, Adiesha" userId="15fd5c93-10d6-4014-8103-1a4931e3c018" providerId="ADAL" clId="{42A7EE47-EC45-4CA9-8431-8D220F8AFA23}" dt="2025-01-18T02:47:30.446" v="30" actId="5793"/>
+        <pc:sldMkLst>
+          <pc:docMk/>
+          <pc:sldMk cId="4179239522" sldId="1486"/>
+        </pc:sldMkLst>
+        <pc:spChg chg="mod">
+          <ac:chgData name="Liyana Ralalage, Adiesha" userId="15fd5c93-10d6-4014-8103-1a4931e3c018" providerId="ADAL" clId="{42A7EE47-EC45-4CA9-8431-8D220F8AFA23}" dt="2025-01-18T02:47:28.030" v="29" actId="122"/>
+          <ac:spMkLst>
+            <pc:docMk/>
+            <pc:sldMk cId="4179239522" sldId="1486"/>
+            <ac:spMk id="2" creationId="{C3E95CE2-E946-D0D2-4C9A-91B8B36B6BDA}"/>
+          </ac:spMkLst>
+        </pc:spChg>
+        <pc:spChg chg="mod">
+          <ac:chgData name="Liyana Ralalage, Adiesha" userId="15fd5c93-10d6-4014-8103-1a4931e3c018" providerId="ADAL" clId="{42A7EE47-EC45-4CA9-8431-8D220F8AFA23}" dt="2025-01-18T02:47:30.446" v="30" actId="5793"/>
+          <ac:spMkLst>
+            <pc:docMk/>
+            <pc:sldMk cId="4179239522" sldId="1486"/>
+            <ac:spMk id="3" creationId="{0D7A0418-5971-3898-730C-89C6D0AD0F9C}"/>
+          </ac:spMkLst>
+        </pc:spChg>
+      </pc:sldChg>
+      <pc:sldChg chg="modSp new mod">
+        <pc:chgData name="Liyana Ralalage, Adiesha" userId="15fd5c93-10d6-4014-8103-1a4931e3c018" providerId="ADAL" clId="{42A7EE47-EC45-4CA9-8431-8D220F8AFA23}" dt="2025-01-18T02:47:25.378" v="28" actId="122"/>
+        <pc:sldMkLst>
+          <pc:docMk/>
+          <pc:sldMk cId="4106880485" sldId="1487"/>
+        </pc:sldMkLst>
+        <pc:spChg chg="mod">
+          <ac:chgData name="Liyana Ralalage, Adiesha" userId="15fd5c93-10d6-4014-8103-1a4931e3c018" providerId="ADAL" clId="{42A7EE47-EC45-4CA9-8431-8D220F8AFA23}" dt="2025-01-18T02:47:25.378" v="28" actId="122"/>
+          <ac:spMkLst>
+            <pc:docMk/>
+            <pc:sldMk cId="4106880485" sldId="1487"/>
+            <ac:spMk id="2" creationId="{447C8CDD-F48E-C939-1D01-8C95E183C19E}"/>
+          </ac:spMkLst>
+        </pc:spChg>
+        <pc:spChg chg="mod">
+          <ac:chgData name="Liyana Ralalage, Adiesha" userId="15fd5c93-10d6-4014-8103-1a4931e3c018" providerId="ADAL" clId="{42A7EE47-EC45-4CA9-8431-8D220F8AFA23}" dt="2025-01-18T02:47:22.649" v="27" actId="20577"/>
+          <ac:spMkLst>
+            <pc:docMk/>
+            <pc:sldMk cId="4106880485" sldId="1487"/>
+            <ac:spMk id="3" creationId="{C52DE5AE-2AA3-EBC9-EAF0-D2B546EEAB5D}"/>
+          </ac:spMkLst>
+        </pc:spChg>
+      </pc:sldChg>
+    </pc:docChg>
+  </pc:docChgLst>
   <pc:docChgLst>
     <pc:chgData name="Liyana Ralalage, Adiesha" userId="15fd5c93-10d6-4014-8103-1a4931e3c018" providerId="ADAL" clId="{F6627E7C-254C-4CFC-85E7-687213A6AF2E}"/>
     <pc:docChg chg="undo custSel addSld delSld modSld sldOrd">
@@ -707,7 +756,7 @@
           <a:p>
             <a:fld id="{3E018B17-D05F-4BFE-BF60-C867D3CB2D66}" type="datetimeFigureOut">
               <a:rPr lang="en-US" smtClean="0"/>
-              <a:t>1/15/2025</a:t>
+              <a:t>1/17/2025</a:t>
             </a:fld>
             <a:endParaRPr lang="en-US"/>
           </a:p>
@@ -1121,7 +1170,7 @@
           <a:p>
             <a:fld id="{352FB5A3-6A64-45F4-98E5-A4680FD77D30}" type="datetimeFigureOut">
               <a:rPr lang="en-US" smtClean="0"/>
-              <a:t>1/15/2025</a:t>
+              <a:t>1/17/2025</a:t>
             </a:fld>
             <a:endParaRPr lang="en-US"/>
           </a:p>
@@ -1319,7 +1368,7 @@
           <a:p>
             <a:fld id="{352FB5A3-6A64-45F4-98E5-A4680FD77D30}" type="datetimeFigureOut">
               <a:rPr lang="en-US" smtClean="0"/>
-              <a:t>1/15/2025</a:t>
+              <a:t>1/17/2025</a:t>
             </a:fld>
             <a:endParaRPr lang="en-US"/>
           </a:p>
@@ -1527,7 +1576,7 @@
           <a:p>
             <a:fld id="{352FB5A3-6A64-45F4-98E5-A4680FD77D30}" type="datetimeFigureOut">
               <a:rPr lang="en-US" smtClean="0"/>
-              <a:t>1/15/2025</a:t>
+              <a:t>1/17/2025</a:t>
             </a:fld>
             <a:endParaRPr lang="en-US"/>
           </a:p>
@@ -1725,7 +1774,7 @@
           <a:p>
             <a:fld id="{352FB5A3-6A64-45F4-98E5-A4680FD77D30}" type="datetimeFigureOut">
               <a:rPr lang="en-US" smtClean="0"/>
-              <a:t>1/15/2025</a:t>
+              <a:t>1/17/2025</a:t>
             </a:fld>
             <a:endParaRPr lang="en-US"/>
           </a:p>
@@ -2000,7 +2049,7 @@
           <a:p>
             <a:fld id="{352FB5A3-6A64-45F4-98E5-A4680FD77D30}" type="datetimeFigureOut">
               <a:rPr lang="en-US" smtClean="0"/>
-              <a:t>1/15/2025</a:t>
+              <a:t>1/17/2025</a:t>
             </a:fld>
             <a:endParaRPr lang="en-US"/>
           </a:p>
@@ -2265,7 +2314,7 @@
           <a:p>
             <a:fld id="{352FB5A3-6A64-45F4-98E5-A4680FD77D30}" type="datetimeFigureOut">
               <a:rPr lang="en-US" smtClean="0"/>
-              <a:t>1/15/2025</a:t>
+              <a:t>1/17/2025</a:t>
             </a:fld>
             <a:endParaRPr lang="en-US"/>
           </a:p>
@@ -2677,7 +2726,7 @@
           <a:p>
             <a:fld id="{352FB5A3-6A64-45F4-98E5-A4680FD77D30}" type="datetimeFigureOut">
               <a:rPr lang="en-US" smtClean="0"/>
-              <a:t>1/15/2025</a:t>
+              <a:t>1/17/2025</a:t>
             </a:fld>
             <a:endParaRPr lang="en-US"/>
           </a:p>
@@ -2818,7 +2867,7 @@
           <a:p>
             <a:fld id="{352FB5A3-6A64-45F4-98E5-A4680FD77D30}" type="datetimeFigureOut">
               <a:rPr lang="en-US" smtClean="0"/>
-              <a:t>1/15/2025</a:t>
+              <a:t>1/17/2025</a:t>
             </a:fld>
             <a:endParaRPr lang="en-US"/>
           </a:p>
@@ -2931,7 +2980,7 @@
           <a:p>
             <a:fld id="{352FB5A3-6A64-45F4-98E5-A4680FD77D30}" type="datetimeFigureOut">
               <a:rPr lang="en-US" smtClean="0"/>
-              <a:t>1/15/2025</a:t>
+              <a:t>1/17/2025</a:t>
             </a:fld>
             <a:endParaRPr lang="en-US"/>
           </a:p>
@@ -3242,7 +3291,7 @@
           <a:p>
             <a:fld id="{352FB5A3-6A64-45F4-98E5-A4680FD77D30}" type="datetimeFigureOut">
               <a:rPr lang="en-US" smtClean="0"/>
-              <a:t>1/15/2025</a:t>
+              <a:t>1/17/2025</a:t>
             </a:fld>
             <a:endParaRPr lang="en-US"/>
           </a:p>
@@ -3530,7 +3579,7 @@
           <a:p>
             <a:fld id="{352FB5A3-6A64-45F4-98E5-A4680FD77D30}" type="datetimeFigureOut">
               <a:rPr lang="en-US" smtClean="0"/>
-              <a:t>1/15/2025</a:t>
+              <a:t>1/17/2025</a:t>
             </a:fld>
             <a:endParaRPr lang="en-US"/>
           </a:p>
@@ -3771,7 +3820,7 @@
           <a:p>
             <a:fld id="{352FB5A3-6A64-45F4-98E5-A4680FD77D30}" type="datetimeFigureOut">
               <a:rPr lang="en-US" smtClean="0"/>
-              <a:t>1/15/2025</a:t>
+              <a:t>1/17/2025</a:t>
             </a:fld>
             <a:endParaRPr lang="en-US"/>
           </a:p>
@@ -17405,6 +17454,320 @@
           <p:cNvPr id="2" name="Title 1">
             <a:extLst>
               <a:ext uri="{FF2B5EF4-FFF2-40B4-BE49-F238E27FC236}">
+                <a16:creationId xmlns:a16="http://schemas.microsoft.com/office/drawing/2014/main" id="{C3E95CE2-E946-D0D2-4C9A-91B8B36B6BDA}"/>
+              </a:ext>
+            </a:extLst>
+          </p:cNvPr>
+          <p:cNvSpPr>
+            <a:spLocks noGrp="1"/>
+          </p:cNvSpPr>
+          <p:nvPr>
+            <p:ph type="title"/>
+          </p:nvPr>
+        </p:nvSpPr>
+        <p:spPr/>
+        <p:txBody>
+          <a:bodyPr/>
+          <a:lstStyle/>
+          <a:p>
+            <a:pPr algn="ctr"/>
+            <a:r>
+              <a:rPr lang="en-US" dirty="0"/>
+              <a:t>Office hours</a:t>
+            </a:r>
+          </a:p>
+        </p:txBody>
+      </p:sp>
+      <p:sp>
+        <p:nvSpPr>
+          <p:cNvPr id="3" name="Content Placeholder 2">
+            <a:extLst>
+              <a:ext uri="{FF2B5EF4-FFF2-40B4-BE49-F238E27FC236}">
+                <a16:creationId xmlns:a16="http://schemas.microsoft.com/office/drawing/2014/main" id="{0D7A0418-5971-3898-730C-89C6D0AD0F9C}"/>
+              </a:ext>
+            </a:extLst>
+          </p:cNvPr>
+          <p:cNvSpPr>
+            <a:spLocks noGrp="1"/>
+          </p:cNvSpPr>
+          <p:nvPr>
+            <p:ph idx="1"/>
+          </p:nvPr>
+        </p:nvSpPr>
+        <p:spPr/>
+        <p:txBody>
+          <a:bodyPr/>
+          <a:lstStyle/>
+          <a:p>
+            <a:pPr algn="l"/>
+            <a:r>
+              <a:rPr lang="en-US" b="0" i="0" dirty="0">
+                <a:solidFill>
+                  <a:srgbClr val="202122"/>
+                </a:solidFill>
+                <a:effectLst/>
+                <a:latin typeface="Lato" panose="020F0502020204030203" pitchFamily="34" charset="0"/>
+              </a:rPr>
+              <a:t>Instructor (Adiesha Liyanage) </a:t>
+            </a:r>
+          </a:p>
+          <a:p>
+            <a:pPr algn="l"/>
+            <a:r>
+              <a:rPr lang="en-US" b="0" i="0" dirty="0">
+                <a:solidFill>
+                  <a:srgbClr val="202122"/>
+                </a:solidFill>
+                <a:effectLst/>
+                <a:latin typeface="Lato" panose="020F0502020204030203" pitchFamily="34" charset="0"/>
+              </a:rPr>
+              <a:t>Monday 12:15pm - 2:15 pm</a:t>
+            </a:r>
+          </a:p>
+          <a:p>
+            <a:pPr algn="l"/>
+            <a:r>
+              <a:rPr lang="en-US" b="0" i="0" dirty="0">
+                <a:solidFill>
+                  <a:srgbClr val="202122"/>
+                </a:solidFill>
+                <a:effectLst/>
+                <a:latin typeface="Lato" panose="020F0502020204030203" pitchFamily="34" charset="0"/>
+              </a:rPr>
+              <a:t>Friday  12:15pm - 1:15pm</a:t>
+            </a:r>
+          </a:p>
+          <a:p>
+            <a:pPr algn="l"/>
+            <a:r>
+              <a:rPr lang="en-US" b="0" i="0" dirty="0">
+                <a:solidFill>
+                  <a:srgbClr val="202122"/>
+                </a:solidFill>
+                <a:effectLst/>
+                <a:latin typeface="Lato" panose="020F0502020204030203" pitchFamily="34" charset="0"/>
+              </a:rPr>
+              <a:t>Email: </a:t>
+            </a:r>
+            <a:r>
+              <a:rPr lang="en-US" b="0" i="0" u="none" strike="noStrike" dirty="0">
+                <a:solidFill>
+                  <a:srgbClr val="202122"/>
+                </a:solidFill>
+                <a:effectLst/>
+                <a:latin typeface="Lato" panose="020F0502020204030203" pitchFamily="34" charset="0"/>
+                <a:hlinkClick r:id="rId2"/>
+              </a:rPr>
+              <a:t>a.liyanaralalage@montana.edu</a:t>
+            </a:r>
+            <a:endParaRPr lang="en-US" b="0" i="0" dirty="0">
+              <a:solidFill>
+                <a:srgbClr val="202122"/>
+              </a:solidFill>
+              <a:effectLst/>
+              <a:latin typeface="Lato" panose="020F0502020204030203" pitchFamily="34" charset="0"/>
+            </a:endParaRPr>
+          </a:p>
+          <a:p>
+            <a:pPr marL="0" indent="0">
+              <a:buNone/>
+            </a:pPr>
+            <a:endParaRPr lang="en-US" dirty="0"/>
+          </a:p>
+        </p:txBody>
+      </p:sp>
+    </p:spTree>
+    <p:extLst>
+      <p:ext uri="{BB962C8B-B14F-4D97-AF65-F5344CB8AC3E}">
+        <p14:creationId xmlns:p14="http://schemas.microsoft.com/office/powerpoint/2010/main" val="4179239522"/>
+      </p:ext>
+    </p:extLst>
+  </p:cSld>
+  <p:clrMapOvr>
+    <a:masterClrMapping/>
+  </p:clrMapOvr>
+</p:sld>
+</file>
+
+<file path=ppt/slides/slide25.xml><?xml version="1.0" encoding="utf-8"?>
+<p:sld xmlns:a="http://schemas.openxmlformats.org/drawingml/2006/main" xmlns:r="http://schemas.openxmlformats.org/officeDocument/2006/relationships" xmlns:p="http://schemas.openxmlformats.org/presentationml/2006/main">
+  <p:cSld>
+    <p:spTree>
+      <p:nvGrpSpPr>
+        <p:cNvPr id="1" name=""/>
+        <p:cNvGrpSpPr/>
+        <p:nvPr/>
+      </p:nvGrpSpPr>
+      <p:grpSpPr>
+        <a:xfrm>
+          <a:off x="0" y="0"/>
+          <a:ext cx="0" cy="0"/>
+          <a:chOff x="0" y="0"/>
+          <a:chExt cx="0" cy="0"/>
+        </a:xfrm>
+      </p:grpSpPr>
+      <p:sp>
+        <p:nvSpPr>
+          <p:cNvPr id="2" name="Title 1">
+            <a:extLst>
+              <a:ext uri="{FF2B5EF4-FFF2-40B4-BE49-F238E27FC236}">
+                <a16:creationId xmlns:a16="http://schemas.microsoft.com/office/drawing/2014/main" id="{447C8CDD-F48E-C939-1D01-8C95E183C19E}"/>
+              </a:ext>
+            </a:extLst>
+          </p:cNvPr>
+          <p:cNvSpPr>
+            <a:spLocks noGrp="1"/>
+          </p:cNvSpPr>
+          <p:nvPr>
+            <p:ph type="title"/>
+          </p:nvPr>
+        </p:nvSpPr>
+        <p:spPr/>
+        <p:txBody>
+          <a:bodyPr/>
+          <a:lstStyle/>
+          <a:p>
+            <a:pPr algn="ctr"/>
+            <a:r>
+              <a:rPr lang="en-US" dirty="0"/>
+              <a:t>TA</a:t>
+            </a:r>
+          </a:p>
+        </p:txBody>
+      </p:sp>
+      <p:sp>
+        <p:nvSpPr>
+          <p:cNvPr id="3" name="Content Placeholder 2">
+            <a:extLst>
+              <a:ext uri="{FF2B5EF4-FFF2-40B4-BE49-F238E27FC236}">
+                <a16:creationId xmlns:a16="http://schemas.microsoft.com/office/drawing/2014/main" id="{C52DE5AE-2AA3-EBC9-EAF0-D2B546EEAB5D}"/>
+              </a:ext>
+            </a:extLst>
+          </p:cNvPr>
+          <p:cNvSpPr>
+            <a:spLocks noGrp="1"/>
+          </p:cNvSpPr>
+          <p:nvPr>
+            <p:ph idx="1"/>
+          </p:nvPr>
+        </p:nvSpPr>
+        <p:spPr/>
+        <p:txBody>
+          <a:bodyPr/>
+          <a:lstStyle/>
+          <a:p>
+            <a:pPr algn="l"/>
+            <a:r>
+              <a:rPr lang="en-US" b="0" i="0" dirty="0">
+                <a:solidFill>
+                  <a:srgbClr val="202122"/>
+                </a:solidFill>
+                <a:effectLst/>
+                <a:latin typeface="Lato" panose="020F0502020204030203" pitchFamily="34" charset="0"/>
+              </a:rPr>
+              <a:t>Gideon Popoola</a:t>
+            </a:r>
+          </a:p>
+          <a:p>
+            <a:pPr algn="l"/>
+            <a:r>
+              <a:rPr lang="en-US" b="0" i="0" dirty="0">
+                <a:solidFill>
+                  <a:srgbClr val="202122"/>
+                </a:solidFill>
+                <a:effectLst/>
+                <a:latin typeface="Lato" panose="020F0502020204030203" pitchFamily="34" charset="0"/>
+              </a:rPr>
+              <a:t>Office hours:</a:t>
+            </a:r>
+          </a:p>
+          <a:p>
+            <a:pPr algn="l"/>
+            <a:r>
+              <a:rPr lang="en-US" b="0" i="0" dirty="0">
+                <a:solidFill>
+                  <a:srgbClr val="202122"/>
+                </a:solidFill>
+                <a:effectLst/>
+                <a:latin typeface="Lato" panose="020F0502020204030203" pitchFamily="34" charset="0"/>
+              </a:rPr>
+              <a:t>Mondays, 2pm - 4pm</a:t>
+            </a:r>
+          </a:p>
+          <a:p>
+            <a:pPr algn="l"/>
+            <a:r>
+              <a:rPr lang="en-US" b="0" i="0" dirty="0">
+                <a:solidFill>
+                  <a:srgbClr val="202122"/>
+                </a:solidFill>
+                <a:effectLst/>
+                <a:latin typeface="Lato" panose="020F0502020204030203" pitchFamily="34" charset="0"/>
+              </a:rPr>
+              <a:t>Email: </a:t>
+            </a:r>
+            <a:r>
+              <a:rPr lang="en-US" b="0" i="0" u="none" strike="noStrike" dirty="0">
+                <a:solidFill>
+                  <a:srgbClr val="202122"/>
+                </a:solidFill>
+                <a:effectLst/>
+                <a:latin typeface="Lato" panose="020F0502020204030203" pitchFamily="34" charset="0"/>
+                <a:hlinkClick r:id="rId2"/>
+              </a:rPr>
+              <a:t>gideon.popoola@student.montana.edu</a:t>
+            </a:r>
+            <a:r>
+              <a:rPr lang="en-US" b="0" i="0" dirty="0">
+                <a:solidFill>
+                  <a:srgbClr val="202122"/>
+                </a:solidFill>
+                <a:effectLst/>
+                <a:latin typeface="Lato" panose="020F0502020204030203" pitchFamily="34" charset="0"/>
+              </a:rPr>
+              <a:t> </a:t>
+            </a:r>
+          </a:p>
+          <a:p>
+            <a:endParaRPr lang="en-US" dirty="0"/>
+          </a:p>
+        </p:txBody>
+      </p:sp>
+    </p:spTree>
+    <p:extLst>
+      <p:ext uri="{BB962C8B-B14F-4D97-AF65-F5344CB8AC3E}">
+        <p14:creationId xmlns:p14="http://schemas.microsoft.com/office/powerpoint/2010/main" val="4106880485"/>
+      </p:ext>
+    </p:extLst>
+  </p:cSld>
+  <p:clrMapOvr>
+    <a:masterClrMapping/>
+  </p:clrMapOvr>
+</p:sld>
+</file>
+
+<file path=ppt/slides/slide26.xml><?xml version="1.0" encoding="utf-8"?>
+<p:sld xmlns:a="http://schemas.openxmlformats.org/drawingml/2006/main" xmlns:r="http://schemas.openxmlformats.org/officeDocument/2006/relationships" xmlns:p="http://schemas.openxmlformats.org/presentationml/2006/main">
+  <p:cSld>
+    <p:spTree>
+      <p:nvGrpSpPr>
+        <p:cNvPr id="1" name=""/>
+        <p:cNvGrpSpPr/>
+        <p:nvPr/>
+      </p:nvGrpSpPr>
+      <p:grpSpPr>
+        <a:xfrm>
+          <a:off x="0" y="0"/>
+          <a:ext cx="0" cy="0"/>
+          <a:chOff x="0" y="0"/>
+          <a:chExt cx="0" cy="0"/>
+        </a:xfrm>
+      </p:grpSpPr>
+      <p:sp>
+        <p:nvSpPr>
+          <p:cNvPr id="2" name="Title 1">
+            <a:extLst>
+              <a:ext uri="{FF2B5EF4-FFF2-40B4-BE49-F238E27FC236}">
                 <a16:creationId xmlns:a16="http://schemas.microsoft.com/office/drawing/2014/main" id="{7EC67B92-47B0-B3BF-1DB8-0E711209EA2E}"/>
               </a:ext>
             </a:extLst>
@@ -17504,7 +17867,7 @@
 </p:sld>
 </file>
 
-<file path=ppt/slides/slide25.xml><?xml version="1.0" encoding="utf-8"?>
+<file path=ppt/slides/slide27.xml><?xml version="1.0" encoding="utf-8"?>
 <p:sld xmlns:a="http://schemas.openxmlformats.org/drawingml/2006/main" xmlns:r="http://schemas.openxmlformats.org/officeDocument/2006/relationships" xmlns:p="http://schemas.openxmlformats.org/presentationml/2006/main">
   <p:cSld>
     <p:spTree>
@@ -17811,7 +18174,7 @@
 </p:sld>
 </file>
 
-<file path=ppt/slides/slide26.xml><?xml version="1.0" encoding="utf-8"?>
+<file path=ppt/slides/slide28.xml><?xml version="1.0" encoding="utf-8"?>
 <p:sld xmlns:a="http://schemas.openxmlformats.org/drawingml/2006/main" xmlns:r="http://schemas.openxmlformats.org/officeDocument/2006/relationships" xmlns:p="http://schemas.openxmlformats.org/presentationml/2006/main">
   <p:cSld>
     <p:spTree>
@@ -17948,7 +18311,7 @@
 </p:sld>
 </file>
 
-<file path=ppt/slides/slide27.xml><?xml version="1.0" encoding="utf-8"?>
+<file path=ppt/slides/slide29.xml><?xml version="1.0" encoding="utf-8"?>
 <p:sld xmlns:a="http://schemas.openxmlformats.org/drawingml/2006/main" xmlns:r="http://schemas.openxmlformats.org/officeDocument/2006/relationships" xmlns:p="http://schemas.openxmlformats.org/presentationml/2006/main">
   <p:cSld>
     <p:spTree>
@@ -18039,395 +18402,6 @@
     <p:extLst>
       <p:ext uri="{BB962C8B-B14F-4D97-AF65-F5344CB8AC3E}">
         <p14:creationId xmlns:p14="http://schemas.microsoft.com/office/powerpoint/2010/main" val="3703392850"/>
-      </p:ext>
-    </p:extLst>
-  </p:cSld>
-  <p:clrMapOvr>
-    <a:masterClrMapping/>
-  </p:clrMapOvr>
-</p:sld>
-</file>
-
-<file path=ppt/slides/slide28.xml><?xml version="1.0" encoding="utf-8"?>
-<p:sld xmlns:a="http://schemas.openxmlformats.org/drawingml/2006/main" xmlns:r="http://schemas.openxmlformats.org/officeDocument/2006/relationships" xmlns:p="http://schemas.openxmlformats.org/presentationml/2006/main">
-  <p:cSld>
-    <p:spTree>
-      <p:nvGrpSpPr>
-        <p:cNvPr id="1" name=""/>
-        <p:cNvGrpSpPr/>
-        <p:nvPr/>
-      </p:nvGrpSpPr>
-      <p:grpSpPr>
-        <a:xfrm>
-          <a:off x="0" y="0"/>
-          <a:ext cx="0" cy="0"/>
-          <a:chOff x="0" y="0"/>
-          <a:chExt cx="0" cy="0"/>
-        </a:xfrm>
-      </p:grpSpPr>
-      <p:sp>
-        <p:nvSpPr>
-          <p:cNvPr id="2" name="Title 1">
-            <a:extLst>
-              <a:ext uri="{FF2B5EF4-FFF2-40B4-BE49-F238E27FC236}">
-                <a16:creationId xmlns:a16="http://schemas.microsoft.com/office/drawing/2014/main" id="{7EC67B92-47B0-B3BF-1DB8-0E711209EA2E}"/>
-              </a:ext>
-            </a:extLst>
-          </p:cNvPr>
-          <p:cNvSpPr>
-            <a:spLocks noGrp="1"/>
-          </p:cNvSpPr>
-          <p:nvPr>
-            <p:ph type="title"/>
-          </p:nvPr>
-        </p:nvSpPr>
-        <p:spPr/>
-        <p:txBody>
-          <a:bodyPr/>
-          <a:lstStyle/>
-          <a:p>
-            <a:pPr algn="l"/>
-            <a:r>
-              <a:rPr lang="en-US" i="0" dirty="0">
-                <a:solidFill>
-                  <a:srgbClr val="1F2328"/>
-                </a:solidFill>
-                <a:effectLst/>
-                <a:latin typeface="-apple-system"/>
-              </a:rPr>
-              <a:t>Collaboration policy</a:t>
-            </a:r>
-          </a:p>
-        </p:txBody>
-      </p:sp>
-      <p:sp>
-        <p:nvSpPr>
-          <p:cNvPr id="3" name="Content Placeholder 2">
-            <a:extLst>
-              <a:ext uri="{FF2B5EF4-FFF2-40B4-BE49-F238E27FC236}">
-                <a16:creationId xmlns:a16="http://schemas.microsoft.com/office/drawing/2014/main" id="{EC6AB66D-ECF1-1F44-9ED7-58D2E272D69C}"/>
-              </a:ext>
-            </a:extLst>
-          </p:cNvPr>
-          <p:cNvSpPr>
-            <a:spLocks noGrp="1"/>
-          </p:cNvSpPr>
-          <p:nvPr>
-            <p:ph idx="1"/>
-          </p:nvPr>
-        </p:nvSpPr>
-        <p:spPr/>
-        <p:txBody>
-          <a:bodyPr/>
-          <a:lstStyle/>
-          <a:p>
-            <a:pPr algn="l">
-              <a:buFont typeface="Arial" panose="020B0604020202020204" pitchFamily="34" charset="0"/>
-              <a:buChar char="•"/>
-            </a:pPr>
-            <a:r>
-              <a:rPr lang="en-US" b="0" i="0" dirty="0">
-                <a:solidFill>
-                  <a:srgbClr val="1F2328"/>
-                </a:solidFill>
-                <a:effectLst/>
-                <a:latin typeface="-apple-system"/>
-              </a:rPr>
-              <a:t>For your homework assignments, you may discuss the problem with your peers.</a:t>
-            </a:r>
-          </a:p>
-          <a:p>
-            <a:pPr algn="l">
-              <a:buFont typeface="Arial" panose="020B0604020202020204" pitchFamily="34" charset="0"/>
-              <a:buChar char="•"/>
-            </a:pPr>
-            <a:r>
-              <a:rPr lang="en-US" b="0" i="0" dirty="0">
-                <a:solidFill>
-                  <a:srgbClr val="1F2328"/>
-                </a:solidFill>
-                <a:effectLst/>
-                <a:latin typeface="-apple-system"/>
-              </a:rPr>
-              <a:t>However, you are not allowed to copy proofs from your peers or use generative AI to complete your assignments.</a:t>
-            </a:r>
-          </a:p>
-          <a:p>
-            <a:pPr algn="l">
-              <a:buFont typeface="Arial" panose="020B0604020202020204" pitchFamily="34" charset="0"/>
-              <a:buChar char="•"/>
-            </a:pPr>
-            <a:r>
-              <a:rPr lang="en-US" b="0" i="0" dirty="0">
-                <a:solidFill>
-                  <a:srgbClr val="1F2328"/>
-                </a:solidFill>
-                <a:effectLst/>
-                <a:latin typeface="-apple-system"/>
-              </a:rPr>
-              <a:t>If you use resources from the internet to solve problems, you MUST cite them.</a:t>
-            </a:r>
-          </a:p>
-        </p:txBody>
-      </p:sp>
-    </p:spTree>
-    <p:extLst>
-      <p:ext uri="{BB962C8B-B14F-4D97-AF65-F5344CB8AC3E}">
-        <p14:creationId xmlns:p14="http://schemas.microsoft.com/office/powerpoint/2010/main" val="1663006263"/>
-      </p:ext>
-    </p:extLst>
-  </p:cSld>
-  <p:clrMapOvr>
-    <a:masterClrMapping/>
-  </p:clrMapOvr>
-</p:sld>
-</file>
-
-<file path=ppt/slides/slide29.xml><?xml version="1.0" encoding="utf-8"?>
-<p:sld xmlns:a="http://schemas.openxmlformats.org/drawingml/2006/main" xmlns:r="http://schemas.openxmlformats.org/officeDocument/2006/relationships" xmlns:p="http://schemas.openxmlformats.org/presentationml/2006/main">
-  <p:cSld>
-    <p:spTree>
-      <p:nvGrpSpPr>
-        <p:cNvPr id="1" name=""/>
-        <p:cNvGrpSpPr/>
-        <p:nvPr/>
-      </p:nvGrpSpPr>
-      <p:grpSpPr>
-        <a:xfrm>
-          <a:off x="0" y="0"/>
-          <a:ext cx="0" cy="0"/>
-          <a:chOff x="0" y="0"/>
-          <a:chExt cx="0" cy="0"/>
-        </a:xfrm>
-      </p:grpSpPr>
-      <p:sp>
-        <p:nvSpPr>
-          <p:cNvPr id="2" name="Title 1">
-            <a:extLst>
-              <a:ext uri="{FF2B5EF4-FFF2-40B4-BE49-F238E27FC236}">
-                <a16:creationId xmlns:a16="http://schemas.microsoft.com/office/drawing/2014/main" id="{48BE7964-BEF4-6BE5-08FC-7F1A31F0198A}"/>
-              </a:ext>
-            </a:extLst>
-          </p:cNvPr>
-          <p:cNvSpPr>
-            <a:spLocks noGrp="1"/>
-          </p:cNvSpPr>
-          <p:nvPr>
-            <p:ph type="title"/>
-          </p:nvPr>
-        </p:nvSpPr>
-        <p:spPr/>
-        <p:txBody>
-          <a:bodyPr/>
-          <a:lstStyle/>
-          <a:p>
-            <a:r>
-              <a:rPr lang="en-US" dirty="0"/>
-              <a:t>Latex</a:t>
-            </a:r>
-          </a:p>
-        </p:txBody>
-      </p:sp>
-      <p:sp>
-        <p:nvSpPr>
-          <p:cNvPr id="3" name="Content Placeholder 2">
-            <a:extLst>
-              <a:ext uri="{FF2B5EF4-FFF2-40B4-BE49-F238E27FC236}">
-                <a16:creationId xmlns:a16="http://schemas.microsoft.com/office/drawing/2014/main" id="{FD17621F-68A8-240F-3682-F8BC40948381}"/>
-              </a:ext>
-            </a:extLst>
-          </p:cNvPr>
-          <p:cNvSpPr>
-            <a:spLocks noGrp="1"/>
-          </p:cNvSpPr>
-          <p:nvPr>
-            <p:ph idx="1"/>
-          </p:nvPr>
-        </p:nvSpPr>
-        <p:spPr>
-          <a:xfrm>
-            <a:off x="838200" y="1465243"/>
-            <a:ext cx="10773578" cy="5027632"/>
-          </a:xfrm>
-        </p:spPr>
-        <p:txBody>
-          <a:bodyPr>
-            <a:normAutofit fontScale="92500" lnSpcReduction="20000"/>
-          </a:bodyPr>
-          <a:lstStyle/>
-          <a:p>
-            <a:pPr algn="l">
-              <a:buFont typeface="Arial" panose="020B0604020202020204" pitchFamily="34" charset="0"/>
-              <a:buChar char="•"/>
-            </a:pPr>
-            <a:r>
-              <a:rPr lang="en-US" b="0" i="0" dirty="0">
-                <a:solidFill>
-                  <a:srgbClr val="1F2328"/>
-                </a:solidFill>
-                <a:effectLst/>
-                <a:latin typeface="-apple-system"/>
-              </a:rPr>
-              <a:t>Assignments MUST be completed using LaTeX and submitted as a PDF. There will be no exceptions to this rule—grading handwritten proofs is extremely difficult, so I must enforce this for the sake of the TA's sanity.</a:t>
-            </a:r>
-          </a:p>
-          <a:p>
-            <a:pPr algn="l">
-              <a:buFont typeface="Arial" panose="020B0604020202020204" pitchFamily="34" charset="0"/>
-              <a:buChar char="•"/>
-            </a:pPr>
-            <a:r>
-              <a:rPr lang="en-US" b="0" i="0" dirty="0">
-                <a:solidFill>
-                  <a:srgbClr val="1F2328"/>
-                </a:solidFill>
-                <a:effectLst/>
-                <a:latin typeface="-apple-system"/>
-              </a:rPr>
-              <a:t>You can create a free </a:t>
-            </a:r>
-            <a:r>
-              <a:rPr lang="en-US" b="0" i="0" u="sng" dirty="0">
-                <a:solidFill>
-                  <a:srgbClr val="1F2328"/>
-                </a:solidFill>
-                <a:effectLst/>
-                <a:latin typeface="-apple-system"/>
-                <a:hlinkClick r:id="rId2"/>
-              </a:rPr>
-              <a:t>Overleaf</a:t>
-            </a:r>
-            <a:r>
-              <a:rPr lang="en-US" b="0" i="0" dirty="0">
-                <a:solidFill>
-                  <a:srgbClr val="1F2328"/>
-                </a:solidFill>
-                <a:effectLst/>
-                <a:latin typeface="-apple-system"/>
-              </a:rPr>
-              <a:t> account, which is a free platform for editing and compiling complex LaTeX documents online. This is very similar to Google Docs but with LaTeX.</a:t>
-            </a:r>
-          </a:p>
-          <a:p>
-            <a:pPr algn="l">
-              <a:buFont typeface="Arial" panose="020B0604020202020204" pitchFamily="34" charset="0"/>
-              <a:buChar char="•"/>
-            </a:pPr>
-            <a:r>
-              <a:rPr lang="en-US" b="0" i="0" dirty="0">
-                <a:solidFill>
-                  <a:srgbClr val="1F2328"/>
-                </a:solidFill>
-                <a:effectLst/>
-                <a:latin typeface="-apple-system"/>
-              </a:rPr>
-              <a:t>Basic </a:t>
-            </a:r>
-            <a:r>
-              <a:rPr lang="en-US" b="0" i="0" u="sng" dirty="0">
-                <a:solidFill>
-                  <a:srgbClr val="1F2328"/>
-                </a:solidFill>
-                <a:effectLst/>
-                <a:latin typeface="-apple-system"/>
-                <a:hlinkClick r:id="rId3"/>
-              </a:rPr>
-              <a:t>Overleaf latex</a:t>
-            </a:r>
-            <a:r>
-              <a:rPr lang="en-US" b="0" i="0" dirty="0">
-                <a:solidFill>
-                  <a:srgbClr val="1F2328"/>
-                </a:solidFill>
-                <a:effectLst/>
-                <a:latin typeface="-apple-system"/>
-              </a:rPr>
-              <a:t> tutorials.</a:t>
-            </a:r>
-          </a:p>
-          <a:p>
-            <a:pPr algn="l">
-              <a:buFont typeface="Arial" panose="020B0604020202020204" pitchFamily="34" charset="0"/>
-              <a:buChar char="•"/>
-            </a:pPr>
-            <a:r>
-              <a:rPr lang="en-US" b="0" i="0" dirty="0">
-                <a:solidFill>
-                  <a:srgbClr val="1F2328"/>
-                </a:solidFill>
-                <a:effectLst/>
-                <a:latin typeface="-apple-system"/>
-              </a:rPr>
-              <a:t>If you do not know the LaTeX code for a specific mathematical symbol, you can use the following </a:t>
-            </a:r>
-            <a:r>
-              <a:rPr lang="en-US" b="0" i="0" u="sng" dirty="0">
-                <a:solidFill>
-                  <a:srgbClr val="1F2328"/>
-                </a:solidFill>
-                <a:effectLst/>
-                <a:latin typeface="-apple-system"/>
-                <a:hlinkClick r:id="rId4"/>
-              </a:rPr>
-              <a:t>website</a:t>
-            </a:r>
-            <a:r>
-              <a:rPr lang="en-US" b="0" i="0" dirty="0">
-                <a:solidFill>
-                  <a:srgbClr val="1F2328"/>
-                </a:solidFill>
-                <a:effectLst/>
-                <a:latin typeface="-apple-system"/>
-              </a:rPr>
-              <a:t>: </a:t>
-            </a:r>
-            <a:r>
-              <a:rPr lang="en-US" b="0" i="0" u="sng" dirty="0">
-                <a:solidFill>
-                  <a:srgbClr val="1F2328"/>
-                </a:solidFill>
-                <a:effectLst/>
-                <a:latin typeface="-apple-system"/>
-                <a:hlinkClick r:id="rId4"/>
-              </a:rPr>
-              <a:t>https://detexify.kirelabs.org/classify.html</a:t>
-            </a:r>
-            <a:r>
-              <a:rPr lang="en-US" b="0" i="0" dirty="0">
-                <a:solidFill>
-                  <a:srgbClr val="1F2328"/>
-                </a:solidFill>
-                <a:effectLst/>
-                <a:latin typeface="-apple-system"/>
-              </a:rPr>
-              <a:t> Draw the symbol that you want; it will provide you the necessary code for that symbol and the packages that you have to import.</a:t>
-            </a:r>
-          </a:p>
-          <a:p>
-            <a:pPr algn="l">
-              <a:buFont typeface="Arial" panose="020B0604020202020204" pitchFamily="34" charset="0"/>
-              <a:buChar char="•"/>
-            </a:pPr>
-            <a:r>
-              <a:rPr lang="en-US" b="0" i="0" dirty="0">
-                <a:solidFill>
-                  <a:srgbClr val="1F2328"/>
-                </a:solidFill>
-                <a:effectLst/>
-                <a:latin typeface="-apple-system"/>
-              </a:rPr>
-              <a:t>Using LaTeX for mathematical writing is infinitely easier than using Word or handwriting the solutions once you get the hang of it.</a:t>
-            </a:r>
-          </a:p>
-          <a:p>
-            <a:endParaRPr lang="en-US" dirty="0"/>
-          </a:p>
-        </p:txBody>
-      </p:sp>
-    </p:spTree>
-    <p:extLst>
-      <p:ext uri="{BB962C8B-B14F-4D97-AF65-F5344CB8AC3E}">
-        <p14:creationId xmlns:p14="http://schemas.microsoft.com/office/powerpoint/2010/main" val="2929959629"/>
       </p:ext>
     </p:extLst>
   </p:cSld>
@@ -18512,6 +18486,395 @@
     <p:extLst>
       <p:ext uri="{BB962C8B-B14F-4D97-AF65-F5344CB8AC3E}">
         <p14:creationId xmlns:p14="http://schemas.microsoft.com/office/powerpoint/2010/main" val="218197257"/>
+      </p:ext>
+    </p:extLst>
+  </p:cSld>
+  <p:clrMapOvr>
+    <a:masterClrMapping/>
+  </p:clrMapOvr>
+</p:sld>
+</file>
+
+<file path=ppt/slides/slide30.xml><?xml version="1.0" encoding="utf-8"?>
+<p:sld xmlns:a="http://schemas.openxmlformats.org/drawingml/2006/main" xmlns:r="http://schemas.openxmlformats.org/officeDocument/2006/relationships" xmlns:p="http://schemas.openxmlformats.org/presentationml/2006/main">
+  <p:cSld>
+    <p:spTree>
+      <p:nvGrpSpPr>
+        <p:cNvPr id="1" name=""/>
+        <p:cNvGrpSpPr/>
+        <p:nvPr/>
+      </p:nvGrpSpPr>
+      <p:grpSpPr>
+        <a:xfrm>
+          <a:off x="0" y="0"/>
+          <a:ext cx="0" cy="0"/>
+          <a:chOff x="0" y="0"/>
+          <a:chExt cx="0" cy="0"/>
+        </a:xfrm>
+      </p:grpSpPr>
+      <p:sp>
+        <p:nvSpPr>
+          <p:cNvPr id="2" name="Title 1">
+            <a:extLst>
+              <a:ext uri="{FF2B5EF4-FFF2-40B4-BE49-F238E27FC236}">
+                <a16:creationId xmlns:a16="http://schemas.microsoft.com/office/drawing/2014/main" id="{7EC67B92-47B0-B3BF-1DB8-0E711209EA2E}"/>
+              </a:ext>
+            </a:extLst>
+          </p:cNvPr>
+          <p:cNvSpPr>
+            <a:spLocks noGrp="1"/>
+          </p:cNvSpPr>
+          <p:nvPr>
+            <p:ph type="title"/>
+          </p:nvPr>
+        </p:nvSpPr>
+        <p:spPr/>
+        <p:txBody>
+          <a:bodyPr/>
+          <a:lstStyle/>
+          <a:p>
+            <a:pPr algn="l"/>
+            <a:r>
+              <a:rPr lang="en-US" i="0" dirty="0">
+                <a:solidFill>
+                  <a:srgbClr val="1F2328"/>
+                </a:solidFill>
+                <a:effectLst/>
+                <a:latin typeface="-apple-system"/>
+              </a:rPr>
+              <a:t>Collaboration policy</a:t>
+            </a:r>
+          </a:p>
+        </p:txBody>
+      </p:sp>
+      <p:sp>
+        <p:nvSpPr>
+          <p:cNvPr id="3" name="Content Placeholder 2">
+            <a:extLst>
+              <a:ext uri="{FF2B5EF4-FFF2-40B4-BE49-F238E27FC236}">
+                <a16:creationId xmlns:a16="http://schemas.microsoft.com/office/drawing/2014/main" id="{EC6AB66D-ECF1-1F44-9ED7-58D2E272D69C}"/>
+              </a:ext>
+            </a:extLst>
+          </p:cNvPr>
+          <p:cNvSpPr>
+            <a:spLocks noGrp="1"/>
+          </p:cNvSpPr>
+          <p:nvPr>
+            <p:ph idx="1"/>
+          </p:nvPr>
+        </p:nvSpPr>
+        <p:spPr/>
+        <p:txBody>
+          <a:bodyPr/>
+          <a:lstStyle/>
+          <a:p>
+            <a:pPr algn="l">
+              <a:buFont typeface="Arial" panose="020B0604020202020204" pitchFamily="34" charset="0"/>
+              <a:buChar char="•"/>
+            </a:pPr>
+            <a:r>
+              <a:rPr lang="en-US" b="0" i="0" dirty="0">
+                <a:solidFill>
+                  <a:srgbClr val="1F2328"/>
+                </a:solidFill>
+                <a:effectLst/>
+                <a:latin typeface="-apple-system"/>
+              </a:rPr>
+              <a:t>For your homework assignments, you may discuss the problem with your peers.</a:t>
+            </a:r>
+          </a:p>
+          <a:p>
+            <a:pPr algn="l">
+              <a:buFont typeface="Arial" panose="020B0604020202020204" pitchFamily="34" charset="0"/>
+              <a:buChar char="•"/>
+            </a:pPr>
+            <a:r>
+              <a:rPr lang="en-US" b="0" i="0" dirty="0">
+                <a:solidFill>
+                  <a:srgbClr val="1F2328"/>
+                </a:solidFill>
+                <a:effectLst/>
+                <a:latin typeface="-apple-system"/>
+              </a:rPr>
+              <a:t>However, you are not allowed to copy proofs from your peers or use generative AI to complete your assignments.</a:t>
+            </a:r>
+          </a:p>
+          <a:p>
+            <a:pPr algn="l">
+              <a:buFont typeface="Arial" panose="020B0604020202020204" pitchFamily="34" charset="0"/>
+              <a:buChar char="•"/>
+            </a:pPr>
+            <a:r>
+              <a:rPr lang="en-US" b="0" i="0" dirty="0">
+                <a:solidFill>
+                  <a:srgbClr val="1F2328"/>
+                </a:solidFill>
+                <a:effectLst/>
+                <a:latin typeface="-apple-system"/>
+              </a:rPr>
+              <a:t>If you use resources from the internet to solve problems, you MUST cite them.</a:t>
+            </a:r>
+          </a:p>
+        </p:txBody>
+      </p:sp>
+    </p:spTree>
+    <p:extLst>
+      <p:ext uri="{BB962C8B-B14F-4D97-AF65-F5344CB8AC3E}">
+        <p14:creationId xmlns:p14="http://schemas.microsoft.com/office/powerpoint/2010/main" val="1663006263"/>
+      </p:ext>
+    </p:extLst>
+  </p:cSld>
+  <p:clrMapOvr>
+    <a:masterClrMapping/>
+  </p:clrMapOvr>
+</p:sld>
+</file>
+
+<file path=ppt/slides/slide31.xml><?xml version="1.0" encoding="utf-8"?>
+<p:sld xmlns:a="http://schemas.openxmlformats.org/drawingml/2006/main" xmlns:r="http://schemas.openxmlformats.org/officeDocument/2006/relationships" xmlns:p="http://schemas.openxmlformats.org/presentationml/2006/main">
+  <p:cSld>
+    <p:spTree>
+      <p:nvGrpSpPr>
+        <p:cNvPr id="1" name=""/>
+        <p:cNvGrpSpPr/>
+        <p:nvPr/>
+      </p:nvGrpSpPr>
+      <p:grpSpPr>
+        <a:xfrm>
+          <a:off x="0" y="0"/>
+          <a:ext cx="0" cy="0"/>
+          <a:chOff x="0" y="0"/>
+          <a:chExt cx="0" cy="0"/>
+        </a:xfrm>
+      </p:grpSpPr>
+      <p:sp>
+        <p:nvSpPr>
+          <p:cNvPr id="2" name="Title 1">
+            <a:extLst>
+              <a:ext uri="{FF2B5EF4-FFF2-40B4-BE49-F238E27FC236}">
+                <a16:creationId xmlns:a16="http://schemas.microsoft.com/office/drawing/2014/main" id="{48BE7964-BEF4-6BE5-08FC-7F1A31F0198A}"/>
+              </a:ext>
+            </a:extLst>
+          </p:cNvPr>
+          <p:cNvSpPr>
+            <a:spLocks noGrp="1"/>
+          </p:cNvSpPr>
+          <p:nvPr>
+            <p:ph type="title"/>
+          </p:nvPr>
+        </p:nvSpPr>
+        <p:spPr/>
+        <p:txBody>
+          <a:bodyPr/>
+          <a:lstStyle/>
+          <a:p>
+            <a:r>
+              <a:rPr lang="en-US" dirty="0"/>
+              <a:t>Latex</a:t>
+            </a:r>
+          </a:p>
+        </p:txBody>
+      </p:sp>
+      <p:sp>
+        <p:nvSpPr>
+          <p:cNvPr id="3" name="Content Placeholder 2">
+            <a:extLst>
+              <a:ext uri="{FF2B5EF4-FFF2-40B4-BE49-F238E27FC236}">
+                <a16:creationId xmlns:a16="http://schemas.microsoft.com/office/drawing/2014/main" id="{FD17621F-68A8-240F-3682-F8BC40948381}"/>
+              </a:ext>
+            </a:extLst>
+          </p:cNvPr>
+          <p:cNvSpPr>
+            <a:spLocks noGrp="1"/>
+          </p:cNvSpPr>
+          <p:nvPr>
+            <p:ph idx="1"/>
+          </p:nvPr>
+        </p:nvSpPr>
+        <p:spPr>
+          <a:xfrm>
+            <a:off x="838200" y="1465243"/>
+            <a:ext cx="10773578" cy="5027632"/>
+          </a:xfrm>
+        </p:spPr>
+        <p:txBody>
+          <a:bodyPr>
+            <a:normAutofit fontScale="92500" lnSpcReduction="20000"/>
+          </a:bodyPr>
+          <a:lstStyle/>
+          <a:p>
+            <a:pPr algn="l">
+              <a:buFont typeface="Arial" panose="020B0604020202020204" pitchFamily="34" charset="0"/>
+              <a:buChar char="•"/>
+            </a:pPr>
+            <a:r>
+              <a:rPr lang="en-US" b="0" i="0" dirty="0">
+                <a:solidFill>
+                  <a:srgbClr val="1F2328"/>
+                </a:solidFill>
+                <a:effectLst/>
+                <a:latin typeface="-apple-system"/>
+              </a:rPr>
+              <a:t>Assignments MUST be completed using LaTeX and submitted as a PDF. There will be no exceptions to this rule—grading handwritten proofs is extremely difficult, so I must enforce this for the sake of the TA's sanity.</a:t>
+            </a:r>
+          </a:p>
+          <a:p>
+            <a:pPr algn="l">
+              <a:buFont typeface="Arial" panose="020B0604020202020204" pitchFamily="34" charset="0"/>
+              <a:buChar char="•"/>
+            </a:pPr>
+            <a:r>
+              <a:rPr lang="en-US" b="0" i="0" dirty="0">
+                <a:solidFill>
+                  <a:srgbClr val="1F2328"/>
+                </a:solidFill>
+                <a:effectLst/>
+                <a:latin typeface="-apple-system"/>
+              </a:rPr>
+              <a:t>You can create a free </a:t>
+            </a:r>
+            <a:r>
+              <a:rPr lang="en-US" b="0" i="0" u="sng" dirty="0">
+                <a:solidFill>
+                  <a:srgbClr val="1F2328"/>
+                </a:solidFill>
+                <a:effectLst/>
+                <a:latin typeface="-apple-system"/>
+                <a:hlinkClick r:id="rId2"/>
+              </a:rPr>
+              <a:t>Overleaf</a:t>
+            </a:r>
+            <a:r>
+              <a:rPr lang="en-US" b="0" i="0" dirty="0">
+                <a:solidFill>
+                  <a:srgbClr val="1F2328"/>
+                </a:solidFill>
+                <a:effectLst/>
+                <a:latin typeface="-apple-system"/>
+              </a:rPr>
+              <a:t> account, which is a free platform for editing and compiling complex LaTeX documents online. This is very similar to Google Docs but with LaTeX.</a:t>
+            </a:r>
+          </a:p>
+          <a:p>
+            <a:pPr algn="l">
+              <a:buFont typeface="Arial" panose="020B0604020202020204" pitchFamily="34" charset="0"/>
+              <a:buChar char="•"/>
+            </a:pPr>
+            <a:r>
+              <a:rPr lang="en-US" b="0" i="0" dirty="0">
+                <a:solidFill>
+                  <a:srgbClr val="1F2328"/>
+                </a:solidFill>
+                <a:effectLst/>
+                <a:latin typeface="-apple-system"/>
+              </a:rPr>
+              <a:t>Basic </a:t>
+            </a:r>
+            <a:r>
+              <a:rPr lang="en-US" b="0" i="0" u="sng" dirty="0">
+                <a:solidFill>
+                  <a:srgbClr val="1F2328"/>
+                </a:solidFill>
+                <a:effectLst/>
+                <a:latin typeface="-apple-system"/>
+                <a:hlinkClick r:id="rId3"/>
+              </a:rPr>
+              <a:t>Overleaf latex</a:t>
+            </a:r>
+            <a:r>
+              <a:rPr lang="en-US" b="0" i="0" dirty="0">
+                <a:solidFill>
+                  <a:srgbClr val="1F2328"/>
+                </a:solidFill>
+                <a:effectLst/>
+                <a:latin typeface="-apple-system"/>
+              </a:rPr>
+              <a:t> tutorials.</a:t>
+            </a:r>
+          </a:p>
+          <a:p>
+            <a:pPr algn="l">
+              <a:buFont typeface="Arial" panose="020B0604020202020204" pitchFamily="34" charset="0"/>
+              <a:buChar char="•"/>
+            </a:pPr>
+            <a:r>
+              <a:rPr lang="en-US" b="0" i="0" dirty="0">
+                <a:solidFill>
+                  <a:srgbClr val="1F2328"/>
+                </a:solidFill>
+                <a:effectLst/>
+                <a:latin typeface="-apple-system"/>
+              </a:rPr>
+              <a:t>If you do not know the LaTeX code for a specific mathematical symbol, you can use the following </a:t>
+            </a:r>
+            <a:r>
+              <a:rPr lang="en-US" b="0" i="0" u="sng" dirty="0">
+                <a:solidFill>
+                  <a:srgbClr val="1F2328"/>
+                </a:solidFill>
+                <a:effectLst/>
+                <a:latin typeface="-apple-system"/>
+                <a:hlinkClick r:id="rId4"/>
+              </a:rPr>
+              <a:t>website</a:t>
+            </a:r>
+            <a:r>
+              <a:rPr lang="en-US" b="0" i="0" dirty="0">
+                <a:solidFill>
+                  <a:srgbClr val="1F2328"/>
+                </a:solidFill>
+                <a:effectLst/>
+                <a:latin typeface="-apple-system"/>
+              </a:rPr>
+              <a:t>: </a:t>
+            </a:r>
+            <a:r>
+              <a:rPr lang="en-US" b="0" i="0" u="sng" dirty="0">
+                <a:solidFill>
+                  <a:srgbClr val="1F2328"/>
+                </a:solidFill>
+                <a:effectLst/>
+                <a:latin typeface="-apple-system"/>
+                <a:hlinkClick r:id="rId4"/>
+              </a:rPr>
+              <a:t>https://detexify.kirelabs.org/classify.html</a:t>
+            </a:r>
+            <a:r>
+              <a:rPr lang="en-US" b="0" i="0" dirty="0">
+                <a:solidFill>
+                  <a:srgbClr val="1F2328"/>
+                </a:solidFill>
+                <a:effectLst/>
+                <a:latin typeface="-apple-system"/>
+              </a:rPr>
+              <a:t> Draw the symbol that you want; it will provide you the necessary code for that symbol and the packages that you have to import.</a:t>
+            </a:r>
+          </a:p>
+          <a:p>
+            <a:pPr algn="l">
+              <a:buFont typeface="Arial" panose="020B0604020202020204" pitchFamily="34" charset="0"/>
+              <a:buChar char="•"/>
+            </a:pPr>
+            <a:r>
+              <a:rPr lang="en-US" b="0" i="0" dirty="0">
+                <a:solidFill>
+                  <a:srgbClr val="1F2328"/>
+                </a:solidFill>
+                <a:effectLst/>
+                <a:latin typeface="-apple-system"/>
+              </a:rPr>
+              <a:t>Using LaTeX for mathematical writing is infinitely easier than using Word or handwriting the solutions once you get the hang of it.</a:t>
+            </a:r>
+          </a:p>
+          <a:p>
+            <a:endParaRPr lang="en-US" dirty="0"/>
+          </a:p>
+        </p:txBody>
+      </p:sp>
+    </p:spTree>
+    <p:extLst>
+      <p:ext uri="{BB962C8B-B14F-4D97-AF65-F5344CB8AC3E}">
+        <p14:creationId xmlns:p14="http://schemas.microsoft.com/office/powerpoint/2010/main" val="2929959629"/>
       </p:ext>
     </p:extLst>
   </p:cSld>

</xml_diff>